<commit_message>
added mini batch and overfitting
</commit_message>
<xml_diff>
--- a/Week 3 - Neural Networks in Practice/Mini-Batches.pptx
+++ b/Week 3 - Neural Networks in Practice/Mini-Batches.pptx
@@ -8166,8 +8166,8 @@
           </p:sp>
         </mc:Fallback>
       </mc:AlternateContent>
-      <mc:AlternateContent xmlns:mc="http://schemas.openxmlformats.org/markup-compatibility/2006">
-        <mc:Choice xmlns:a14="http://schemas.microsoft.com/office/drawing/2010/main" Requires="a14">
+      <mc:AlternateContent xmlns:mc="http://schemas.openxmlformats.org/markup-compatibility/2006" xmlns:a14="http://schemas.microsoft.com/office/drawing/2010/main">
+        <mc:Choice Requires="a14">
           <p:sp>
             <p:nvSpPr>
               <p:cNvPr id="7" name="TextBox 6">
@@ -8303,7 +8303,7 @@
             </p:txBody>
           </p:sp>
         </mc:Choice>
-        <mc:Fallback>
+        <mc:Fallback xmlns="">
           <p:sp>
             <p:nvSpPr>
               <p:cNvPr id="7" name="TextBox 6">
@@ -8767,8 +8767,8 @@
             <a:chExt cx="3233051" cy="374100"/>
           </a:xfrm>
         </p:grpSpPr>
-        <mc:AlternateContent xmlns:mc="http://schemas.openxmlformats.org/markup-compatibility/2006">
-          <mc:Choice xmlns:a14="http://schemas.microsoft.com/office/drawing/2010/main" Requires="a14">
+        <mc:AlternateContent xmlns:mc="http://schemas.openxmlformats.org/markup-compatibility/2006" xmlns:a14="http://schemas.microsoft.com/office/drawing/2010/main">
+          <mc:Choice Requires="a14">
             <p:sp>
               <p:nvSpPr>
                 <p:cNvPr id="28" name="TextBox 27">
@@ -8844,7 +8844,7 @@
               </p:txBody>
             </p:sp>
           </mc:Choice>
-          <mc:Fallback>
+          <mc:Fallback xmlns="">
             <p:sp>
               <p:nvSpPr>
                 <p:cNvPr id="28" name="TextBox 27">
@@ -8890,8 +8890,8 @@
             </p:sp>
           </mc:Fallback>
         </mc:AlternateContent>
-        <mc:AlternateContent xmlns:mc="http://schemas.openxmlformats.org/markup-compatibility/2006">
-          <mc:Choice xmlns:a14="http://schemas.microsoft.com/office/drawing/2010/main" Requires="a14">
+        <mc:AlternateContent xmlns:mc="http://schemas.openxmlformats.org/markup-compatibility/2006" xmlns:a14="http://schemas.microsoft.com/office/drawing/2010/main">
+          <mc:Choice Requires="a14">
             <p:sp>
               <p:nvSpPr>
                 <p:cNvPr id="29" name="TextBox 28">
@@ -8967,7 +8967,7 @@
               </p:txBody>
             </p:sp>
           </mc:Choice>
-          <mc:Fallback>
+          <mc:Fallback xmlns="">
             <p:sp>
               <p:nvSpPr>
                 <p:cNvPr id="29" name="TextBox 28">
@@ -9013,8 +9013,8 @@
             </p:sp>
           </mc:Fallback>
         </mc:AlternateContent>
-        <mc:AlternateContent xmlns:mc="http://schemas.openxmlformats.org/markup-compatibility/2006">
-          <mc:Choice xmlns:a14="http://schemas.microsoft.com/office/drawing/2010/main" Requires="a14">
+        <mc:AlternateContent xmlns:mc="http://schemas.openxmlformats.org/markup-compatibility/2006" xmlns:a14="http://schemas.microsoft.com/office/drawing/2010/main">
+          <mc:Choice Requires="a14">
             <p:sp>
               <p:nvSpPr>
                 <p:cNvPr id="32" name="TextBox 31">
@@ -9090,7 +9090,7 @@
               </p:txBody>
             </p:sp>
           </mc:Choice>
-          <mc:Fallback>
+          <mc:Fallback xmlns="">
             <p:sp>
               <p:nvSpPr>
                 <p:cNvPr id="32" name="TextBox 31">
@@ -10228,8 +10228,8 @@
           </a:p>
         </p:txBody>
       </p:sp>
-      <mc:AlternateContent xmlns:mc="http://schemas.openxmlformats.org/markup-compatibility/2006">
-        <mc:Choice xmlns:a14="http://schemas.microsoft.com/office/drawing/2010/main" Requires="a14">
+      <mc:AlternateContent xmlns:mc="http://schemas.openxmlformats.org/markup-compatibility/2006" xmlns:a14="http://schemas.microsoft.com/office/drawing/2010/main">
+        <mc:Choice Requires="a14">
           <p:sp>
             <p:nvSpPr>
               <p:cNvPr id="9" name="TextBox 8">
@@ -10294,7 +10294,7 @@
             </p:txBody>
           </p:sp>
         </mc:Choice>
-        <mc:Fallback>
+        <mc:Fallback xmlns="">
           <p:sp>
             <p:nvSpPr>
               <p:cNvPr id="9" name="TextBox 8">
@@ -10340,8 +10340,8 @@
           </p:sp>
         </mc:Fallback>
       </mc:AlternateContent>
-      <mc:AlternateContent xmlns:mc="http://schemas.openxmlformats.org/markup-compatibility/2006">
-        <mc:Choice xmlns:a14="http://schemas.microsoft.com/office/drawing/2010/main" Requires="a14">
+      <mc:AlternateContent xmlns:mc="http://schemas.openxmlformats.org/markup-compatibility/2006" xmlns:a14="http://schemas.microsoft.com/office/drawing/2010/main">
+        <mc:Choice Requires="a14">
           <p:sp>
             <p:nvSpPr>
               <p:cNvPr id="7" name="TextBox 6">
@@ -10484,7 +10484,7 @@
             </p:txBody>
           </p:sp>
         </mc:Choice>
-        <mc:Fallback>
+        <mc:Fallback xmlns="">
           <p:sp>
             <p:nvSpPr>
               <p:cNvPr id="7" name="TextBox 6">
@@ -11332,14 +11332,14 @@
           <p:nvPr>
             <p:extLst>
               <p:ext uri="{D42A27DB-BD31-4B8C-83A1-F6EECF244321}">
-                <p14:modId xmlns:p14="http://schemas.microsoft.com/office/powerpoint/2010/main" val="1819905985"/>
+                <p14:modId xmlns:p14="http://schemas.microsoft.com/office/powerpoint/2010/main" val="873455818"/>
               </p:ext>
             </p:extLst>
           </p:nvPr>
         </p:nvGraphicFramePr>
         <p:xfrm>
           <a:off x="2031997" y="1077687"/>
-          <a:ext cx="8127999" cy="4983480"/>
+          <a:ext cx="8127999" cy="4840655"/>
         </p:xfrm>
         <a:graphic>
           <a:graphicData uri="http://schemas.openxmlformats.org/drawingml/2006/table">
@@ -11443,7 +11443,25 @@
                           </a:solidFill>
                           <a:effectLst/>
                         </a:rPr>
-                        <a:t>Uses a single random sample or a small batch of samples at each iteration.</a:t>
+                        <a:t>Uses a single random </a:t>
+                      </a:r>
+                      <a:r>
+                        <a:rPr lang="en-PH" sz="1700" b="0" u="none" strike="noStrike" kern="1200">
+                          <a:solidFill>
+                            <a:schemeClr val="dk1"/>
+                          </a:solidFill>
+                          <a:effectLst/>
+                        </a:rPr>
+                        <a:t>sample at </a:t>
+                      </a:r>
+                      <a:r>
+                        <a:rPr lang="en-PH" sz="1700" b="0" u="none" strike="noStrike" kern="1200" dirty="0">
+                          <a:solidFill>
+                            <a:schemeClr val="dk1"/>
+                          </a:solidFill>
+                          <a:effectLst/>
+                        </a:rPr>
+                        <a:t>each iteration.</a:t>
                       </a:r>
                       <a:endParaRPr lang="en-US" sz="1700" dirty="0"/>
                     </a:p>
@@ -12025,8 +12043,8 @@
           </a:p>
         </p:txBody>
       </p:sp>
-      <mc:AlternateContent xmlns:mc="http://schemas.openxmlformats.org/markup-compatibility/2006">
-        <mc:Choice xmlns:a14="http://schemas.microsoft.com/office/drawing/2010/main" Requires="a14">
+      <mc:AlternateContent xmlns:mc="http://schemas.openxmlformats.org/markup-compatibility/2006" xmlns:a14="http://schemas.microsoft.com/office/drawing/2010/main">
+        <mc:Choice Requires="a14">
           <p:sp>
             <p:nvSpPr>
               <p:cNvPr id="9" name="TextBox 8">
@@ -12091,7 +12109,7 @@
             </p:txBody>
           </p:sp>
         </mc:Choice>
-        <mc:Fallback>
+        <mc:Fallback xmlns="">
           <p:sp>
             <p:nvSpPr>
               <p:cNvPr id="9" name="TextBox 8">
@@ -12137,8 +12155,8 @@
           </p:sp>
         </mc:Fallback>
       </mc:AlternateContent>
-      <mc:AlternateContent xmlns:mc="http://schemas.openxmlformats.org/markup-compatibility/2006">
-        <mc:Choice xmlns:a14="http://schemas.microsoft.com/office/drawing/2010/main" Requires="a14">
+      <mc:AlternateContent xmlns:mc="http://schemas.openxmlformats.org/markup-compatibility/2006" xmlns:a14="http://schemas.microsoft.com/office/drawing/2010/main">
+        <mc:Choice Requires="a14">
           <p:sp>
             <p:nvSpPr>
               <p:cNvPr id="7" name="TextBox 6">
@@ -12273,7 +12291,7 @@
             </p:txBody>
           </p:sp>
         </mc:Choice>
-        <mc:Fallback>
+        <mc:Fallback xmlns="">
           <p:sp>
             <p:nvSpPr>
               <p:cNvPr id="7" name="TextBox 6">
@@ -14244,8 +14262,8 @@
           </p:sp>
         </mc:Fallback>
       </mc:AlternateContent>
-      <mc:AlternateContent xmlns:mc="http://schemas.openxmlformats.org/markup-compatibility/2006">
-        <mc:Choice xmlns:a14="http://schemas.microsoft.com/office/drawing/2010/main" Requires="a14">
+      <mc:AlternateContent xmlns:mc="http://schemas.openxmlformats.org/markup-compatibility/2006" xmlns:a14="http://schemas.microsoft.com/office/drawing/2010/main">
+        <mc:Choice Requires="a14">
           <p:sp>
             <p:nvSpPr>
               <p:cNvPr id="7" name="TextBox 6">
@@ -14367,7 +14385,7 @@
             </p:txBody>
           </p:sp>
         </mc:Choice>
-        <mc:Fallback>
+        <mc:Fallback xmlns="">
           <p:sp>
             <p:nvSpPr>
               <p:cNvPr id="7" name="TextBox 6">
@@ -15049,8 +15067,8 @@
           </p:sp>
         </mc:Fallback>
       </mc:AlternateContent>
-      <mc:AlternateContent xmlns:mc="http://schemas.openxmlformats.org/markup-compatibility/2006">
-        <mc:Choice xmlns:a14="http://schemas.microsoft.com/office/drawing/2010/main" Requires="a14">
+      <mc:AlternateContent xmlns:mc="http://schemas.openxmlformats.org/markup-compatibility/2006" xmlns:a14="http://schemas.microsoft.com/office/drawing/2010/main">
+        <mc:Choice Requires="a14">
           <p:sp>
             <p:nvSpPr>
               <p:cNvPr id="7" name="TextBox 6">
@@ -15173,7 +15191,7 @@
             </p:txBody>
           </p:sp>
         </mc:Choice>
-        <mc:Fallback>
+        <mc:Fallback xmlns="">
           <p:sp>
             <p:nvSpPr>
               <p:cNvPr id="7" name="TextBox 6">
@@ -16940,8 +16958,8 @@
           </p:sp>
         </mc:Fallback>
       </mc:AlternateContent>
-      <mc:AlternateContent xmlns:mc="http://schemas.openxmlformats.org/markup-compatibility/2006">
-        <mc:Choice xmlns:a14="http://schemas.microsoft.com/office/drawing/2010/main" Requires="a14">
+      <mc:AlternateContent xmlns:mc="http://schemas.openxmlformats.org/markup-compatibility/2006" xmlns:a14="http://schemas.microsoft.com/office/drawing/2010/main">
+        <mc:Choice Requires="a14">
           <p:sp>
             <p:nvSpPr>
               <p:cNvPr id="7" name="TextBox 6">
@@ -17073,7 +17091,7 @@
             </p:txBody>
           </p:sp>
         </mc:Choice>
-        <mc:Fallback>
+        <mc:Fallback xmlns="">
           <p:sp>
             <p:nvSpPr>
               <p:cNvPr id="7" name="TextBox 6">
@@ -21349,8 +21367,8 @@
           </p:sp>
         </mc:Fallback>
       </mc:AlternateContent>
-      <mc:AlternateContent xmlns:mc="http://schemas.openxmlformats.org/markup-compatibility/2006">
-        <mc:Choice xmlns:a14="http://schemas.microsoft.com/office/drawing/2010/main" Requires="a14">
+      <mc:AlternateContent xmlns:mc="http://schemas.openxmlformats.org/markup-compatibility/2006" xmlns:a14="http://schemas.microsoft.com/office/drawing/2010/main">
+        <mc:Choice Requires="a14">
           <p:sp>
             <p:nvSpPr>
               <p:cNvPr id="27" name="TextBox 26">
@@ -21482,7 +21500,7 @@
             </p:txBody>
           </p:sp>
         </mc:Choice>
-        <mc:Fallback>
+        <mc:Fallback xmlns="">
           <p:sp>
             <p:nvSpPr>
               <p:cNvPr id="27" name="TextBox 26">
@@ -22677,8 +22695,8 @@
           </a:p>
         </p:txBody>
       </p:sp>
-      <mc:AlternateContent xmlns:mc="http://schemas.openxmlformats.org/markup-compatibility/2006">
-        <mc:Choice xmlns:a14="http://schemas.microsoft.com/office/drawing/2010/main" Requires="a14">
+      <mc:AlternateContent xmlns:mc="http://schemas.openxmlformats.org/markup-compatibility/2006" xmlns:a14="http://schemas.microsoft.com/office/drawing/2010/main">
+        <mc:Choice Requires="a14">
           <p:sp>
             <p:nvSpPr>
               <p:cNvPr id="27" name="TextBox 26">
@@ -22810,7 +22828,7 @@
             </p:txBody>
           </p:sp>
         </mc:Choice>
-        <mc:Fallback>
+        <mc:Fallback xmlns="">
           <p:sp>
             <p:nvSpPr>
               <p:cNvPr id="27" name="TextBox 26">
@@ -22856,8 +22874,8 @@
           </p:sp>
         </mc:Fallback>
       </mc:AlternateContent>
-      <mc:AlternateContent xmlns:mc="http://schemas.openxmlformats.org/markup-compatibility/2006">
-        <mc:Choice xmlns:a14="http://schemas.microsoft.com/office/drawing/2010/main" Requires="a14">
+      <mc:AlternateContent xmlns:mc="http://schemas.openxmlformats.org/markup-compatibility/2006" xmlns:a14="http://schemas.microsoft.com/office/drawing/2010/main">
+        <mc:Choice Requires="a14">
           <p:sp>
             <p:nvSpPr>
               <p:cNvPr id="43" name="TextBox 42">
@@ -22951,7 +22969,7 @@
             </p:txBody>
           </p:sp>
         </mc:Choice>
-        <mc:Fallback>
+        <mc:Fallback xmlns="">
           <p:sp>
             <p:nvSpPr>
               <p:cNvPr id="43" name="TextBox 42">
@@ -23944,8 +23962,8 @@
             <a:chExt cx="4062149" cy="874663"/>
           </a:xfrm>
         </p:grpSpPr>
-        <mc:AlternateContent xmlns:mc="http://schemas.openxmlformats.org/markup-compatibility/2006">
-          <mc:Choice xmlns:a14="http://schemas.microsoft.com/office/drawing/2010/main" Requires="a14">
+        <mc:AlternateContent xmlns:mc="http://schemas.openxmlformats.org/markup-compatibility/2006" xmlns:a14="http://schemas.microsoft.com/office/drawing/2010/main">
+          <mc:Choice Requires="a14">
             <p:sp>
               <p:nvSpPr>
                 <p:cNvPr id="3" name="TextBox 2">
@@ -24063,7 +24081,7 @@
               </p:txBody>
             </p:sp>
           </mc:Choice>
-          <mc:Fallback>
+          <mc:Fallback xmlns="">
             <p:sp>
               <p:nvSpPr>
                 <p:cNvPr id="3" name="TextBox 2">
@@ -24109,8 +24127,8 @@
             </p:sp>
           </mc:Fallback>
         </mc:AlternateContent>
-        <mc:AlternateContent xmlns:mc="http://schemas.openxmlformats.org/markup-compatibility/2006">
-          <mc:Choice xmlns:a14="http://schemas.microsoft.com/office/drawing/2010/main" Requires="a14">
+        <mc:AlternateContent xmlns:mc="http://schemas.openxmlformats.org/markup-compatibility/2006" xmlns:a14="http://schemas.microsoft.com/office/drawing/2010/main">
+          <mc:Choice Requires="a14">
             <p:sp>
               <p:nvSpPr>
                 <p:cNvPr id="5" name="TextBox 4">
@@ -24228,7 +24246,7 @@
               </p:txBody>
             </p:sp>
           </mc:Choice>
-          <mc:Fallback>
+          <mc:Fallback xmlns="">
             <p:sp>
               <p:nvSpPr>
                 <p:cNvPr id="5" name="TextBox 4">
@@ -24274,8 +24292,8 @@
             </p:sp>
           </mc:Fallback>
         </mc:AlternateContent>
-        <mc:AlternateContent xmlns:mc="http://schemas.openxmlformats.org/markup-compatibility/2006">
-          <mc:Choice xmlns:a14="http://schemas.microsoft.com/office/drawing/2010/main" Requires="a14">
+        <mc:AlternateContent xmlns:mc="http://schemas.openxmlformats.org/markup-compatibility/2006" xmlns:a14="http://schemas.microsoft.com/office/drawing/2010/main">
+          <mc:Choice Requires="a14">
             <p:sp>
               <p:nvSpPr>
                 <p:cNvPr id="7" name="TextBox 6">
@@ -24393,7 +24411,7 @@
               </p:txBody>
             </p:sp>
           </mc:Choice>
-          <mc:Fallback>
+          <mc:Fallback xmlns="">
             <p:sp>
               <p:nvSpPr>
                 <p:cNvPr id="7" name="TextBox 6">
@@ -24439,8 +24457,8 @@
             </p:sp>
           </mc:Fallback>
         </mc:AlternateContent>
-        <mc:AlternateContent xmlns:mc="http://schemas.openxmlformats.org/markup-compatibility/2006">
-          <mc:Choice xmlns:a14="http://schemas.microsoft.com/office/drawing/2010/main" Requires="a14">
+        <mc:AlternateContent xmlns:mc="http://schemas.openxmlformats.org/markup-compatibility/2006" xmlns:a14="http://schemas.microsoft.com/office/drawing/2010/main">
+          <mc:Choice Requires="a14">
             <p:sp>
               <p:nvSpPr>
                 <p:cNvPr id="8" name="TextBox 7">
@@ -24558,7 +24576,7 @@
               </p:txBody>
             </p:sp>
           </mc:Choice>
-          <mc:Fallback>
+          <mc:Fallback xmlns="">
             <p:sp>
               <p:nvSpPr>
                 <p:cNvPr id="8" name="TextBox 7">
@@ -25083,8 +25101,8 @@
           </a:p>
         </p:txBody>
       </p:sp>
-      <mc:AlternateContent xmlns:mc="http://schemas.openxmlformats.org/markup-compatibility/2006">
-        <mc:Choice xmlns:a14="http://schemas.microsoft.com/office/drawing/2010/main" Requires="a14">
+      <mc:AlternateContent xmlns:mc="http://schemas.openxmlformats.org/markup-compatibility/2006" xmlns:a14="http://schemas.microsoft.com/office/drawing/2010/main">
+        <mc:Choice Requires="a14">
           <p:sp>
             <p:nvSpPr>
               <p:cNvPr id="27" name="TextBox 26">
@@ -25216,7 +25234,7 @@
             </p:txBody>
           </p:sp>
         </mc:Choice>
-        <mc:Fallback>
+        <mc:Fallback xmlns="">
           <p:sp>
             <p:nvSpPr>
               <p:cNvPr id="27" name="TextBox 26">
@@ -25262,8 +25280,8 @@
           </p:sp>
         </mc:Fallback>
       </mc:AlternateContent>
-      <mc:AlternateContent xmlns:mc="http://schemas.openxmlformats.org/markup-compatibility/2006">
-        <mc:Choice xmlns:a14="http://schemas.microsoft.com/office/drawing/2010/main" Requires="a14">
+      <mc:AlternateContent xmlns:mc="http://schemas.openxmlformats.org/markup-compatibility/2006" xmlns:a14="http://schemas.microsoft.com/office/drawing/2010/main">
+        <mc:Choice Requires="a14">
           <p:sp>
             <p:nvSpPr>
               <p:cNvPr id="41" name="TextBox 40">
@@ -25292,6 +25310,7 @@
               </a:bodyPr>
               <a:lstStyle/>
               <a:p>
+                <a:pPr/>
                 <a14:m>
                   <m:oMathPara xmlns:m="http://schemas.openxmlformats.org/officeDocument/2006/math">
                     <m:oMathParaPr>
@@ -25446,7 +25465,7 @@
             </p:txBody>
           </p:sp>
         </mc:Choice>
-        <mc:Fallback>
+        <mc:Fallback xmlns="">
           <p:sp>
             <p:nvSpPr>
               <p:cNvPr id="41" name="TextBox 40">
@@ -26366,9 +26385,12 @@
 </file>
 
 <file path=customXml/item1.xml><?xml version="1.0" encoding="utf-8"?>
-<p:properties xmlns:p="http://schemas.microsoft.com/office/2006/metadata/properties" xmlns:xsi="http://www.w3.org/2001/XMLSchema-instance" xmlns:pc="http://schemas.microsoft.com/office/infopath/2007/PartnerControls">
-  <documentManagement/>
-</p:properties>
+<?mso-contentType ?>
+<FormTemplates xmlns="http://schemas.microsoft.com/sharepoint/v3/contenttype/forms">
+  <Display>DocumentLibraryForm</Display>
+  <Edit>DocumentLibraryForm</Edit>
+  <New>DocumentLibraryForm</New>
+</FormTemplates>
 </file>
 
 <file path=customXml/item2.xml><?xml version="1.0" encoding="utf-8"?>
@@ -26504,19 +26526,15 @@
 </file>
 
 <file path=customXml/item3.xml><?xml version="1.0" encoding="utf-8"?>
-<?mso-contentType ?>
-<FormTemplates xmlns="http://schemas.microsoft.com/sharepoint/v3/contenttype/forms">
-  <Display>DocumentLibraryForm</Display>
-  <Edit>DocumentLibraryForm</Edit>
-  <New>DocumentLibraryForm</New>
-</FormTemplates>
+<p:properties xmlns:p="http://schemas.microsoft.com/office/2006/metadata/properties" xmlns:xsi="http://www.w3.org/2001/XMLSchema-instance" xmlns:pc="http://schemas.microsoft.com/office/infopath/2007/PartnerControls">
+  <documentManagement/>
+</p:properties>
 </file>
 
 <file path=customXml/itemProps1.xml><?xml version="1.0" encoding="utf-8"?>
-<ds:datastoreItem xmlns:ds="http://schemas.openxmlformats.org/officeDocument/2006/customXml" ds:itemID="{7ACF14CA-9E7F-410C-99DF-E0FAFDE78C11}">
+<ds:datastoreItem xmlns:ds="http://schemas.openxmlformats.org/officeDocument/2006/customXml" ds:itemID="{6C1A3F1B-CE3A-47AB-9F84-47E786467973}">
   <ds:schemaRefs>
-    <ds:schemaRef ds:uri="http://schemas.microsoft.com/office/2006/metadata/properties"/>
-    <ds:schemaRef ds:uri="http://schemas.microsoft.com/office/infopath/2007/PartnerControls"/>
+    <ds:schemaRef ds:uri="http://schemas.microsoft.com/sharepoint/v3/contenttype/forms"/>
   </ds:schemaRefs>
 </ds:datastoreItem>
 </file>
@@ -26540,9 +26558,10 @@
 </file>
 
 <file path=customXml/itemProps3.xml><?xml version="1.0" encoding="utf-8"?>
-<ds:datastoreItem xmlns:ds="http://schemas.openxmlformats.org/officeDocument/2006/customXml" ds:itemID="{6C1A3F1B-CE3A-47AB-9F84-47E786467973}">
+<ds:datastoreItem xmlns:ds="http://schemas.openxmlformats.org/officeDocument/2006/customXml" ds:itemID="{7ACF14CA-9E7F-410C-99DF-E0FAFDE78C11}">
   <ds:schemaRefs>
-    <ds:schemaRef ds:uri="http://schemas.microsoft.com/sharepoint/v3/contenttype/forms"/>
+    <ds:schemaRef ds:uri="http://schemas.microsoft.com/office/2006/metadata/properties"/>
+    <ds:schemaRef ds:uri="http://schemas.microsoft.com/office/infopath/2007/PartnerControls"/>
   </ds:schemaRefs>
 </ds:datastoreItem>
 </file>
</xml_diff>